<commit_message>
Update of the presentation
</commit_message>
<xml_diff>
--- a/Vasileios Dimitriou.pptx
+++ b/Vasileios Dimitriou.pptx
@@ -7,6 +7,7 @@
   <p:sldIdLst>
     <p:sldId id="256" r:id="rId2"/>
     <p:sldId id="257" r:id="rId3"/>
+    <p:sldId id="258" r:id="rId4"/>
   </p:sldIdLst>
   <p:sldSz cx="9144000" cy="6858000" type="screen4x3"/>
   <p:notesSz cx="6858000" cy="9144000"/>
@@ -5215,6 +5216,123 @@
 </p:sld>
 </file>
 
+<file path=ppt/slides/slide3.xml><?xml version="1.0" encoding="utf-8"?>
+<p:sld xmlns:a="http://schemas.openxmlformats.org/drawingml/2006/main" xmlns:r="http://schemas.openxmlformats.org/officeDocument/2006/relationships" xmlns:p="http://schemas.openxmlformats.org/presentationml/2006/main">
+  <p:cSld>
+    <p:spTree>
+      <p:nvGrpSpPr>
+        <p:cNvPr id="1" name=""/>
+        <p:cNvGrpSpPr/>
+        <p:nvPr/>
+      </p:nvGrpSpPr>
+      <p:grpSpPr>
+        <a:xfrm>
+          <a:off x="0" y="0"/>
+          <a:ext cx="0" cy="0"/>
+          <a:chOff x="0" y="0"/>
+          <a:chExt cx="0" cy="0"/>
+        </a:xfrm>
+      </p:grpSpPr>
+      <p:sp>
+        <p:nvSpPr>
+          <p:cNvPr id="2" name="1 - Τίτλος"/>
+          <p:cNvSpPr>
+            <a:spLocks noGrp="1"/>
+          </p:cNvSpPr>
+          <p:nvPr>
+            <p:ph type="title"/>
+          </p:nvPr>
+        </p:nvSpPr>
+        <p:spPr/>
+        <p:txBody>
+          <a:bodyPr/>
+          <a:lstStyle/>
+          <a:p>
+            <a:r>
+              <a:rPr lang="en-US" dirty="0" smtClean="0"/>
+              <a:t>Data Set </a:t>
+            </a:r>
+            <a:endParaRPr lang="el-GR" dirty="0"/>
+          </a:p>
+        </p:txBody>
+      </p:sp>
+      <p:sp>
+        <p:nvSpPr>
+          <p:cNvPr id="3" name="2 - Θέση περιεχομένου"/>
+          <p:cNvSpPr>
+            <a:spLocks noGrp="1"/>
+          </p:cNvSpPr>
+          <p:nvPr>
+            <p:ph sz="quarter" idx="1"/>
+          </p:nvPr>
+        </p:nvSpPr>
+        <p:spPr>
+          <a:xfrm>
+            <a:off x="457200" y="1600200"/>
+            <a:ext cx="7467600" cy="1108720"/>
+          </a:xfrm>
+        </p:spPr>
+        <p:txBody>
+          <a:bodyPr>
+            <a:normAutofit fontScale="70000" lnSpcReduction="20000"/>
+          </a:bodyPr>
+          <a:lstStyle/>
+          <a:p>
+            <a:pPr>
+              <a:buNone/>
+            </a:pPr>
+            <a:r>
+              <a:rPr lang="en-US" dirty="0" smtClean="0">
+                <a:hlinkClick r:id="rId2"/>
+              </a:rPr>
+              <a:t>Index of /ml/machine-learning-databases/breast-cancer-</a:t>
+            </a:r>
+            <a:r>
+              <a:rPr lang="en-US" dirty="0" err="1" smtClean="0">
+                <a:hlinkClick r:id="rId2"/>
+              </a:rPr>
+              <a:t>wisconsin</a:t>
+            </a:r>
+            <a:r>
+              <a:rPr lang="en-US" dirty="0" smtClean="0">
+                <a:hlinkClick r:id="rId2"/>
+              </a:rPr>
+              <a:t> (uci.edu</a:t>
+            </a:r>
+            <a:r>
+              <a:rPr lang="en-US" dirty="0" smtClean="0">
+                <a:hlinkClick r:id="rId2"/>
+              </a:rPr>
+              <a:t>)</a:t>
+            </a:r>
+            <a:r>
+              <a:rPr lang="en-US" dirty="0" smtClean="0"/>
+              <a:t>  [</a:t>
+            </a:r>
+            <a:r>
+              <a:rPr lang="en-US" dirty="0" err="1" smtClean="0"/>
+              <a:t>Dua</a:t>
+            </a:r>
+            <a:r>
+              <a:rPr lang="en-US" dirty="0" smtClean="0"/>
+              <a:t>, D. and Graff, C. (2019). UCI Machine Learning Repository [http://archive.ics.uci.edu/ml]. Irvine, CA: University of California, School of Information and Computer Science</a:t>
+            </a:r>
+            <a:r>
+              <a:rPr lang="en-US" dirty="0" smtClean="0"/>
+              <a:t>.]</a:t>
+            </a:r>
+            <a:endParaRPr lang="el-GR" dirty="0"/>
+          </a:p>
+        </p:txBody>
+      </p:sp>
+    </p:spTree>
+  </p:cSld>
+  <p:clrMapOvr>
+    <a:masterClrMapping/>
+  </p:clrMapOvr>
+</p:sld>
+</file>
+
 <file path=ppt/theme/theme1.xml><?xml version="1.0" encoding="utf-8"?>
 <a:theme xmlns:a="http://schemas.openxmlformats.org/drawingml/2006/main" name="Προεξοχή">
   <a:themeElements>

</xml_diff>

<commit_message>
Update of script method and pptx
The data analysis script has been updated. The presentation includes the source of the data. Data to be uploaded is pending after the final decision about the dataset.
</commit_message>
<xml_diff>
--- a/Vasileios Dimitriou.pptx
+++ b/Vasileios Dimitriou.pptx
@@ -246,7 +246,8 @@
           <a:p>
             <a:fld id="{5DB993E1-127C-4148-8162-6340ADA0F084}" type="datetimeFigureOut">
               <a:rPr lang="el-GR" smtClean="0"/>
-              <a:t>12/3/2023</a:t>
+              <a:pPr/>
+              <a:t>15/3/2023</a:t>
             </a:fld>
             <a:endParaRPr lang="el-GR"/>
           </a:p>
@@ -992,6 +993,7 @@
           <a:p>
             <a:fld id="{C178494C-32A0-42C4-9CE0-9A3469CB3E58}" type="slidenum">
               <a:rPr lang="el-GR" smtClean="0"/>
+              <a:pPr/>
               <a:t>‹#›</a:t>
             </a:fld>
             <a:endParaRPr lang="el-GR"/>
@@ -1115,7 +1117,8 @@
           <a:p>
             <a:fld id="{5DB993E1-127C-4148-8162-6340ADA0F084}" type="datetimeFigureOut">
               <a:rPr lang="el-GR" smtClean="0"/>
-              <a:t>12/3/2023</a:t>
+              <a:pPr/>
+              <a:t>15/3/2023</a:t>
             </a:fld>
             <a:endParaRPr lang="el-GR"/>
           </a:p>
@@ -1157,6 +1160,7 @@
           <a:p>
             <a:fld id="{C178494C-32A0-42C4-9CE0-9A3469CB3E58}" type="slidenum">
               <a:rPr lang="el-GR" smtClean="0"/>
+              <a:pPr/>
               <a:t>‹#›</a:t>
             </a:fld>
             <a:endParaRPr lang="el-GR"/>
@@ -1290,7 +1294,8 @@
           <a:p>
             <a:fld id="{5DB993E1-127C-4148-8162-6340ADA0F084}" type="datetimeFigureOut">
               <a:rPr lang="el-GR" smtClean="0"/>
-              <a:t>12/3/2023</a:t>
+              <a:pPr/>
+              <a:t>15/3/2023</a:t>
             </a:fld>
             <a:endParaRPr lang="el-GR"/>
           </a:p>
@@ -1332,6 +1337,7 @@
           <a:p>
             <a:fld id="{C178494C-32A0-42C4-9CE0-9A3469CB3E58}" type="slidenum">
               <a:rPr lang="el-GR" smtClean="0"/>
+              <a:pPr/>
               <a:t>‹#›</a:t>
             </a:fld>
             <a:endParaRPr lang="el-GR"/>
@@ -1460,7 +1466,8 @@
           <a:p>
             <a:fld id="{5DB993E1-127C-4148-8162-6340ADA0F084}" type="datetimeFigureOut">
               <a:rPr lang="el-GR" smtClean="0"/>
-              <a:t>12/3/2023</a:t>
+              <a:pPr/>
+              <a:t>15/3/2023</a:t>
             </a:fld>
             <a:endParaRPr lang="el-GR"/>
           </a:p>
@@ -1483,6 +1490,7 @@
           <a:p>
             <a:fld id="{C178494C-32A0-42C4-9CE0-9A3469CB3E58}" type="slidenum">
               <a:rPr lang="el-GR" smtClean="0"/>
+              <a:pPr/>
               <a:t>‹#›</a:t>
             </a:fld>
             <a:endParaRPr lang="el-GR"/>
@@ -1670,7 +1678,8 @@
           <a:p>
             <a:fld id="{5DB993E1-127C-4148-8162-6340ADA0F084}" type="datetimeFigureOut">
               <a:rPr lang="el-GR" smtClean="0"/>
-              <a:t>12/3/2023</a:t>
+              <a:pPr/>
+              <a:t>15/3/2023</a:t>
             </a:fld>
             <a:endParaRPr lang="el-GR"/>
           </a:p>
@@ -2413,6 +2422,7 @@
           <a:p>
             <a:fld id="{C178494C-32A0-42C4-9CE0-9A3469CB3E58}" type="slidenum">
               <a:rPr lang="el-GR" smtClean="0"/>
+              <a:pPr/>
               <a:t>‹#›</a:t>
             </a:fld>
             <a:endParaRPr lang="el-GR"/>
@@ -2484,7 +2494,8 @@
           <a:p>
             <a:fld id="{5DB993E1-127C-4148-8162-6340ADA0F084}" type="datetimeFigureOut">
               <a:rPr lang="el-GR" smtClean="0"/>
-              <a:t>12/3/2023</a:t>
+              <a:pPr/>
+              <a:t>15/3/2023</a:t>
             </a:fld>
             <a:endParaRPr lang="el-GR"/>
           </a:p>
@@ -2526,6 +2537,7 @@
           <a:p>
             <a:fld id="{C178494C-32A0-42C4-9CE0-9A3469CB3E58}" type="slidenum">
               <a:rPr lang="el-GR" smtClean="0"/>
+              <a:pPr/>
               <a:t>‹#›</a:t>
             </a:fld>
             <a:endParaRPr lang="el-GR"/>
@@ -2720,7 +2732,8 @@
           <a:p>
             <a:fld id="{5DB993E1-127C-4148-8162-6340ADA0F084}" type="datetimeFigureOut">
               <a:rPr lang="el-GR" smtClean="0"/>
-              <a:t>12/3/2023</a:t>
+              <a:pPr/>
+              <a:t>15/3/2023</a:t>
             </a:fld>
             <a:endParaRPr lang="el-GR"/>
           </a:p>
@@ -2762,6 +2775,7 @@
           <a:p>
             <a:fld id="{C178494C-32A0-42C4-9CE0-9A3469CB3E58}" type="slidenum">
               <a:rPr lang="el-GR" smtClean="0"/>
+              <a:pPr/>
               <a:t>‹#›</a:t>
             </a:fld>
             <a:endParaRPr lang="el-GR"/>
@@ -3043,7 +3057,8 @@
           <a:p>
             <a:fld id="{5DB993E1-127C-4148-8162-6340ADA0F084}" type="datetimeFigureOut">
               <a:rPr lang="el-GR" smtClean="0"/>
-              <a:t>12/3/2023</a:t>
+              <a:pPr/>
+              <a:t>15/3/2023</a:t>
             </a:fld>
             <a:endParaRPr lang="el-GR"/>
           </a:p>
@@ -3066,6 +3081,7 @@
           <a:p>
             <a:fld id="{C178494C-32A0-42C4-9CE0-9A3469CB3E58}" type="slidenum">
               <a:rPr lang="el-GR" smtClean="0"/>
+              <a:pPr/>
               <a:t>‹#›</a:t>
             </a:fld>
             <a:endParaRPr lang="el-GR"/>
@@ -3133,7 +3149,8 @@
           <a:p>
             <a:fld id="{5DB993E1-127C-4148-8162-6340ADA0F084}" type="datetimeFigureOut">
               <a:rPr lang="el-GR" smtClean="0"/>
-              <a:t>12/3/2023</a:t>
+              <a:pPr/>
+              <a:t>15/3/2023</a:t>
             </a:fld>
             <a:endParaRPr lang="el-GR"/>
           </a:p>
@@ -3175,6 +3192,7 @@
           <a:p>
             <a:fld id="{C178494C-32A0-42C4-9CE0-9A3469CB3E58}" type="slidenum">
               <a:rPr lang="el-GR" smtClean="0"/>
+              <a:pPr/>
               <a:t>‹#›</a:t>
             </a:fld>
             <a:endParaRPr lang="el-GR"/>
@@ -3650,7 +3668,8 @@
           <a:p>
             <a:fld id="{5DB993E1-127C-4148-8162-6340ADA0F084}" type="datetimeFigureOut">
               <a:rPr lang="el-GR" smtClean="0"/>
-              <a:t>12/3/2023</a:t>
+              <a:pPr/>
+              <a:t>15/3/2023</a:t>
             </a:fld>
             <a:endParaRPr lang="el-GR"/>
           </a:p>
@@ -3673,6 +3692,7 @@
           <a:p>
             <a:fld id="{C178494C-32A0-42C4-9CE0-9A3469CB3E58}" type="slidenum">
               <a:rPr lang="el-GR" smtClean="0"/>
+              <a:pPr/>
               <a:t>‹#›</a:t>
             </a:fld>
             <a:endParaRPr lang="el-GR"/>
@@ -4161,7 +4181,8 @@
           <a:p>
             <a:fld id="{5DB993E1-127C-4148-8162-6340ADA0F084}" type="datetimeFigureOut">
               <a:rPr lang="el-GR" smtClean="0"/>
-              <a:t>12/3/2023</a:t>
+              <a:pPr/>
+              <a:t>15/3/2023</a:t>
             </a:fld>
             <a:endParaRPr lang="el-GR"/>
           </a:p>
@@ -4184,6 +4205,7 @@
           <a:p>
             <a:fld id="{C178494C-32A0-42C4-9CE0-9A3469CB3E58}" type="slidenum">
               <a:rPr lang="el-GR" smtClean="0"/>
+              <a:pPr/>
               <a:t>‹#›</a:t>
             </a:fld>
             <a:endParaRPr lang="el-GR"/>
@@ -4406,7 +4428,8 @@
           <a:p>
             <a:fld id="{5DB993E1-127C-4148-8162-6340ADA0F084}" type="datetimeFigureOut">
               <a:rPr lang="el-GR" smtClean="0"/>
-              <a:t>12/3/2023</a:t>
+              <a:pPr/>
+              <a:t>15/3/2023</a:t>
             </a:fld>
             <a:endParaRPr lang="el-GR"/>
           </a:p>
@@ -4682,6 +4705,7 @@
           <a:p>
             <a:fld id="{C178494C-32A0-42C4-9CE0-9A3469CB3E58}" type="slidenum">
               <a:rPr lang="el-GR" smtClean="0"/>
+              <a:pPr/>
               <a:t>‹#›</a:t>
             </a:fld>
             <a:endParaRPr lang="el-GR"/>
@@ -5156,11 +5180,7 @@
           <a:p>
             <a:r>
               <a:rPr lang="el-GR" dirty="0" smtClean="0"/>
-              <a:t>Το </a:t>
-            </a:r>
-            <a:r>
-              <a:rPr lang="el-GR" dirty="0" smtClean="0"/>
-              <a:t>βασικό παραδοτέο είναι ένα κείμενο </a:t>
+              <a:t>Το βασικό παραδοτέο είναι ένα κείμενο </a:t>
             </a:r>
             <a:r>
               <a:rPr lang="el-GR" b="1" dirty="0" smtClean="0"/>
@@ -5193,7 +5213,6 @@
               <a:rPr lang="el-GR" dirty="0" smtClean="0"/>
               <a:t>Πρέπει να ξεκινάει υποχρεωτικά με την ακόλουθη παράγραφο:</a:t>
             </a:r>
-            <a:endParaRPr lang="el-GR" dirty="0" smtClean="0"/>
           </a:p>
           <a:p>
             <a:pPr lvl="1"/>
@@ -5274,7 +5293,7 @@
         </p:spPr>
         <p:txBody>
           <a:bodyPr>
-            <a:normAutofit fontScale="70000" lnSpcReduction="20000"/>
+            <a:normAutofit fontScale="55000" lnSpcReduction="20000"/>
           </a:bodyPr>
           <a:lstStyle/>
           <a:p>
@@ -5297,25 +5316,55 @@
               <a:rPr lang="en-US" dirty="0" smtClean="0">
                 <a:hlinkClick r:id="rId2"/>
               </a:rPr>
-              <a:t> (uci.edu</a:t>
-            </a:r>
-            <a:r>
-              <a:rPr lang="en-US" dirty="0" smtClean="0">
-                <a:hlinkClick r:id="rId2"/>
-              </a:rPr>
-              <a:t>)</a:t>
+              <a:t> (uci.edu)</a:t>
             </a:r>
             <a:r>
               <a:rPr lang="en-US" dirty="0" smtClean="0"/>
-              <a:t>  [</a:t>
+              <a:t>  </a:t>
+            </a:r>
+            <a:r>
+              <a:rPr lang="en-US" dirty="0" smtClean="0"/>
+              <a:t>[</a:t>
             </a:r>
             <a:r>
               <a:rPr lang="en-US" dirty="0" err="1" smtClean="0"/>
-              <a:t>Dua</a:t>
+              <a:t>Wolberg</a:t>
             </a:r>
             <a:r>
               <a:rPr lang="en-US" dirty="0" smtClean="0"/>
-              <a:t>, D. and Graff, C. (2019). UCI Machine Learning Repository [http://archive.ics.uci.edu/ml]. Irvine, CA: University of California, School of Information and Computer Science</a:t>
+              <a:t>, </a:t>
+            </a:r>
+            <a:r>
+              <a:rPr lang="en-US" dirty="0" smtClean="0"/>
+              <a:t>W</a:t>
+            </a:r>
+            <a:r>
+              <a:rPr lang="en-US" dirty="0" smtClean="0"/>
+              <a:t>. , Street N. and </a:t>
+            </a:r>
+            <a:r>
+              <a:rPr lang="en-US" dirty="0" err="1" smtClean="0"/>
+              <a:t>Mangasarian</a:t>
+            </a:r>
+            <a:r>
+              <a:rPr lang="en-US" dirty="0" smtClean="0"/>
+              <a:t> O.. </a:t>
+            </a:r>
+            <a:r>
+              <a:rPr lang="en-US" dirty="0" smtClean="0"/>
+              <a:t>UCI Machine Learning Repository </a:t>
+            </a:r>
+            <a:r>
+              <a:rPr lang="en-US" dirty="0" smtClean="0"/>
+              <a:t>[http</a:t>
+            </a:r>
+            <a:r>
+              <a:rPr lang="en-US" dirty="0" smtClean="0"/>
+              <a:t>://archive.ics.uci.edu/mldatasets/Breast+Cancer+Wisconsin+%28Diagnostic%29]. </a:t>
+            </a:r>
+            <a:r>
+              <a:rPr lang="en-US" dirty="0" smtClean="0"/>
+              <a:t>Irvine, CA: University of California, School of Information and Computer Science</a:t>
             </a:r>
             <a:r>
               <a:rPr lang="en-US" dirty="0" smtClean="0"/>

</xml_diff>